<commit_message>
Add early slide content
</commit_message>
<xml_diff>
--- a/6289_final_draft.pptx
+++ b/6289_final_draft.pptx
@@ -8,10 +8,15 @@
   </p:sldMasterIdLst>
   <p:sldIdLst>
     <p:sldId id="256" r:id="rId4"/>
-    <p:sldId id="258" r:id="rId5"/>
-    <p:sldId id="257" r:id="rId6"/>
-    <p:sldId id="260" r:id="rId7"/>
-    <p:sldId id="259" r:id="rId8"/>
+    <p:sldId id="261" r:id="rId5"/>
+    <p:sldId id="263" r:id="rId6"/>
+    <p:sldId id="262" r:id="rId7"/>
+    <p:sldId id="265" r:id="rId8"/>
+    <p:sldId id="264" r:id="rId9"/>
+    <p:sldId id="266" r:id="rId10"/>
+    <p:sldId id="260" r:id="rId11"/>
+    <p:sldId id="259" r:id="rId12"/>
+    <p:sldId id="257" r:id="rId13"/>
   </p:sldIdLst>
   <p:sldSz cx="12192000" cy="6858000"/>
   <p:notesSz cx="6858000" cy="9144000"/>
@@ -7697,87 +7702,7 @@
 </p:sld>
 </file>
 
-<file path=ppt/slides/slide2.xml><?xml version="1.0" encoding="utf-8"?>
-<p:sld xmlns:a="http://schemas.openxmlformats.org/drawingml/2006/main" xmlns:r="http://schemas.openxmlformats.org/officeDocument/2006/relationships" xmlns:p="http://schemas.openxmlformats.org/presentationml/2006/main">
-  <p:cSld>
-    <p:spTree>
-      <p:nvGrpSpPr>
-        <p:cNvPr id="1" name=""/>
-        <p:cNvGrpSpPr/>
-        <p:nvPr/>
-      </p:nvGrpSpPr>
-      <p:grpSpPr>
-        <a:xfrm>
-          <a:off x="0" y="0"/>
-          <a:ext cx="0" cy="0"/>
-          <a:chOff x="0" y="0"/>
-          <a:chExt cx="0" cy="0"/>
-        </a:xfrm>
-      </p:grpSpPr>
-      <p:sp>
-        <p:nvSpPr>
-          <p:cNvPr id="2" name="Content Placeholder 1">
-            <a:extLst>
-              <a:ext uri="{FF2B5EF4-FFF2-40B4-BE49-F238E27FC236}">
-                <a16:creationId xmlns:a16="http://schemas.microsoft.com/office/drawing/2014/main" id="{0CD34709-59FD-AC83-F70B-82DE84B972D0}"/>
-              </a:ext>
-            </a:extLst>
-          </p:cNvPr>
-          <p:cNvSpPr>
-            <a:spLocks noGrp="1"/>
-          </p:cNvSpPr>
-          <p:nvPr>
-            <p:ph idx="13"/>
-          </p:nvPr>
-        </p:nvSpPr>
-        <p:spPr/>
-        <p:txBody>
-          <a:bodyPr/>
-          <a:lstStyle/>
-          <a:p>
-            <a:endParaRPr lang="LID4096"/>
-          </a:p>
-        </p:txBody>
-      </p:sp>
-      <p:sp>
-        <p:nvSpPr>
-          <p:cNvPr id="3" name="Title 2">
-            <a:extLst>
-              <a:ext uri="{FF2B5EF4-FFF2-40B4-BE49-F238E27FC236}">
-                <a16:creationId xmlns:a16="http://schemas.microsoft.com/office/drawing/2014/main" id="{EF9832F8-68D8-C424-C329-E07A05D916EC}"/>
-              </a:ext>
-            </a:extLst>
-          </p:cNvPr>
-          <p:cNvSpPr>
-            <a:spLocks noGrp="1"/>
-          </p:cNvSpPr>
-          <p:nvPr>
-            <p:ph type="title"/>
-          </p:nvPr>
-        </p:nvSpPr>
-        <p:spPr/>
-        <p:txBody>
-          <a:bodyPr/>
-          <a:lstStyle/>
-          <a:p>
-            <a:endParaRPr lang="LID4096"/>
-          </a:p>
-        </p:txBody>
-      </p:sp>
-    </p:spTree>
-    <p:extLst>
-      <p:ext uri="{BB962C8B-B14F-4D97-AF65-F5344CB8AC3E}">
-        <p14:creationId xmlns:p14="http://schemas.microsoft.com/office/powerpoint/2010/main" val="2412198624"/>
-      </p:ext>
-    </p:extLst>
-  </p:cSld>
-  <p:clrMapOvr>
-    <a:masterClrMapping/>
-  </p:clrMapOvr>
-</p:sld>
-</file>
-
-<file path=ppt/slides/slide3.xml><?xml version="1.0" encoding="utf-8"?>
+<file path=ppt/slides/slide10.xml><?xml version="1.0" encoding="utf-8"?>
 <p:sld xmlns:a="http://schemas.openxmlformats.org/drawingml/2006/main" xmlns:r="http://schemas.openxmlformats.org/officeDocument/2006/relationships" xmlns:p="http://schemas.openxmlformats.org/presentationml/2006/main">
   <p:cSld>
     <p:spTree>
@@ -7911,6 +7836,378 @@
 </p:sld>
 </file>
 
+<file path=ppt/slides/slide2.xml><?xml version="1.0" encoding="utf-8"?>
+<p:sld xmlns:a="http://schemas.openxmlformats.org/drawingml/2006/main" xmlns:r="http://schemas.openxmlformats.org/officeDocument/2006/relationships" xmlns:p="http://schemas.openxmlformats.org/presentationml/2006/main">
+  <p:cSld>
+    <p:spTree>
+      <p:nvGrpSpPr>
+        <p:cNvPr id="1" name="">
+          <a:extLst>
+            <a:ext uri="{FF2B5EF4-FFF2-40B4-BE49-F238E27FC236}">
+              <a16:creationId xmlns:a16="http://schemas.microsoft.com/office/drawing/2014/main" id="{BB10FE91-A0BC-3207-AE1E-723096079EC6}"/>
+            </a:ext>
+          </a:extLst>
+        </p:cNvPr>
+        <p:cNvGrpSpPr/>
+        <p:nvPr/>
+      </p:nvGrpSpPr>
+      <p:grpSpPr>
+        <a:xfrm>
+          <a:off x="0" y="0"/>
+          <a:ext cx="0" cy="0"/>
+          <a:chOff x="0" y="0"/>
+          <a:chExt cx="0" cy="0"/>
+        </a:xfrm>
+      </p:grpSpPr>
+      <p:sp>
+        <p:nvSpPr>
+          <p:cNvPr id="4" name="Content Placeholder 3">
+            <a:extLst>
+              <a:ext uri="{FF2B5EF4-FFF2-40B4-BE49-F238E27FC236}">
+                <a16:creationId xmlns:a16="http://schemas.microsoft.com/office/drawing/2014/main" id="{EDE6F42C-FF27-E31F-F2FC-789CCE5415FC}"/>
+              </a:ext>
+            </a:extLst>
+          </p:cNvPr>
+          <p:cNvSpPr>
+            <a:spLocks noGrp="1"/>
+          </p:cNvSpPr>
+          <p:nvPr>
+            <p:ph sz="quarter" idx="13"/>
+          </p:nvPr>
+        </p:nvSpPr>
+        <p:spPr/>
+        <p:txBody>
+          <a:bodyPr/>
+          <a:lstStyle/>
+          <a:p>
+            <a:r>
+              <a:rPr lang="en-US" dirty="0"/>
+              <a:t>NWS Weather Alerts 1950-2024</a:t>
+            </a:r>
+          </a:p>
+          <a:p>
+            <a:r>
+              <a:rPr lang="en-US" dirty="0"/>
+              <a:t>2020 TIGER Lines Census Tract Polygons</a:t>
+            </a:r>
+          </a:p>
+          <a:p>
+            <a:r>
+              <a:rPr lang="en-US" dirty="0"/>
+              <a:t>NHFL FEMA Flood Layer (?)</a:t>
+            </a:r>
+            <a:endParaRPr lang="LID4096" dirty="0"/>
+          </a:p>
+        </p:txBody>
+      </p:sp>
+      <p:sp>
+        <p:nvSpPr>
+          <p:cNvPr id="3" name="Title 2">
+            <a:extLst>
+              <a:ext uri="{FF2B5EF4-FFF2-40B4-BE49-F238E27FC236}">
+                <a16:creationId xmlns:a16="http://schemas.microsoft.com/office/drawing/2014/main" id="{7CD54B19-28D1-A58E-CC6E-4E39B8FB2FC9}"/>
+              </a:ext>
+            </a:extLst>
+          </p:cNvPr>
+          <p:cNvSpPr>
+            <a:spLocks noGrp="1"/>
+          </p:cNvSpPr>
+          <p:nvPr>
+            <p:ph type="title"/>
+          </p:nvPr>
+        </p:nvSpPr>
+        <p:spPr/>
+        <p:txBody>
+          <a:bodyPr/>
+          <a:lstStyle/>
+          <a:p>
+            <a:r>
+              <a:rPr lang="en-US" dirty="0"/>
+              <a:t>Data Sources</a:t>
+            </a:r>
+            <a:endParaRPr lang="LID4096" dirty="0"/>
+          </a:p>
+        </p:txBody>
+      </p:sp>
+      <p:pic>
+        <p:nvPicPr>
+          <p:cNvPr id="1026" name="Picture 2" descr="United States Census Bureau - Wikipedia">
+            <a:extLst>
+              <a:ext uri="{FF2B5EF4-FFF2-40B4-BE49-F238E27FC236}">
+                <a16:creationId xmlns:a16="http://schemas.microsoft.com/office/drawing/2014/main" id="{DCED2F79-5B92-CDB1-6133-7BA5ADE7D4A4}"/>
+              </a:ext>
+            </a:extLst>
+          </p:cNvPr>
+          <p:cNvPicPr>
+            <a:picLocks noChangeAspect="1" noChangeArrowheads="1"/>
+          </p:cNvPicPr>
+          <p:nvPr/>
+        </p:nvPicPr>
+        <p:blipFill>
+          <a:blip r:embed="rId2">
+            <a:extLst>
+              <a:ext uri="{28A0092B-C50C-407E-A947-70E740481C1C}">
+                <a14:useLocalDpi xmlns:a14="http://schemas.microsoft.com/office/drawing/2010/main" val="0"/>
+              </a:ext>
+            </a:extLst>
+          </a:blip>
+          <a:srcRect/>
+          <a:stretch>
+            <a:fillRect/>
+          </a:stretch>
+        </p:blipFill>
+        <p:spPr bwMode="auto">
+          <a:xfrm>
+            <a:off x="6359106" y="1891611"/>
+            <a:ext cx="1828800" cy="1828800"/>
+          </a:xfrm>
+          <a:prstGeom prst="rect">
+            <a:avLst/>
+          </a:prstGeom>
+          <a:noFill/>
+          <a:extLst>
+            <a:ext uri="{909E8E84-426E-40DD-AFC4-6F175D3DCCD1}">
+              <a14:hiddenFill xmlns:a14="http://schemas.microsoft.com/office/drawing/2010/main">
+                <a:solidFill>
+                  <a:srgbClr val="FFFFFF"/>
+                </a:solidFill>
+              </a14:hiddenFill>
+            </a:ext>
+          </a:extLst>
+        </p:spPr>
+      </p:pic>
+      <p:pic>
+        <p:nvPicPr>
+          <p:cNvPr id="1028" name="Picture 4" descr="Federal Emergency Management Agency | U ...">
+            <a:extLst>
+              <a:ext uri="{FF2B5EF4-FFF2-40B4-BE49-F238E27FC236}">
+                <a16:creationId xmlns:a16="http://schemas.microsoft.com/office/drawing/2014/main" id="{9DD9E948-E5F3-D3F3-3C00-CFC50ACAC5C3}"/>
+              </a:ext>
+            </a:extLst>
+          </p:cNvPr>
+          <p:cNvPicPr>
+            <a:picLocks noChangeAspect="1" noChangeArrowheads="1"/>
+          </p:cNvPicPr>
+          <p:nvPr/>
+        </p:nvPicPr>
+        <p:blipFill rotWithShape="1">
+          <a:blip r:embed="rId3">
+            <a:extLst>
+              <a:ext uri="{28A0092B-C50C-407E-A947-70E740481C1C}">
+                <a14:useLocalDpi xmlns:a14="http://schemas.microsoft.com/office/drawing/2010/main" val="0"/>
+              </a:ext>
+            </a:extLst>
+          </a:blip>
+          <a:srcRect l="26476" r="25658"/>
+          <a:stretch/>
+        </p:blipFill>
+        <p:spPr bwMode="auto">
+          <a:xfrm>
+            <a:off x="9050546" y="1980900"/>
+            <a:ext cx="1440611" cy="1828800"/>
+          </a:xfrm>
+          <a:prstGeom prst="rect">
+            <a:avLst/>
+          </a:prstGeom>
+          <a:noFill/>
+          <a:extLst>
+            <a:ext uri="{909E8E84-426E-40DD-AFC4-6F175D3DCCD1}">
+              <a14:hiddenFill xmlns:a14="http://schemas.microsoft.com/office/drawing/2010/main">
+                <a:solidFill>
+                  <a:srgbClr val="FFFFFF"/>
+                </a:solidFill>
+              </a14:hiddenFill>
+            </a:ext>
+          </a:extLst>
+        </p:spPr>
+      </p:pic>
+      <p:pic>
+        <p:nvPicPr>
+          <p:cNvPr id="1034" name="Picture 10" descr="Home - NWS Social Science - Virtual Lab">
+            <a:extLst>
+              <a:ext uri="{FF2B5EF4-FFF2-40B4-BE49-F238E27FC236}">
+                <a16:creationId xmlns:a16="http://schemas.microsoft.com/office/drawing/2014/main" id="{F8B659AD-19F5-30FB-9CF3-EB929FE99ED7}"/>
+              </a:ext>
+            </a:extLst>
+          </p:cNvPr>
+          <p:cNvPicPr>
+            <a:picLocks noGrp="1" noChangeAspect="1" noChangeArrowheads="1"/>
+          </p:cNvPicPr>
+          <p:nvPr>
+            <p:ph sz="quarter" idx="14"/>
+          </p:nvPr>
+        </p:nvPicPr>
+        <p:blipFill>
+          <a:blip r:embed="rId4">
+            <a:extLst>
+              <a:ext uri="{28A0092B-C50C-407E-A947-70E740481C1C}">
+                <a14:useLocalDpi xmlns:a14="http://schemas.microsoft.com/office/drawing/2010/main" val="0"/>
+              </a:ext>
+            </a:extLst>
+          </a:blip>
+          <a:srcRect/>
+          <a:stretch>
+            <a:fillRect/>
+          </a:stretch>
+        </p:blipFill>
+        <p:spPr bwMode="auto">
+          <a:xfrm>
+            <a:off x="6504586" y="3726574"/>
+            <a:ext cx="2981325" cy="1533525"/>
+          </a:xfrm>
+          <a:prstGeom prst="rect">
+            <a:avLst/>
+          </a:prstGeom>
+          <a:noFill/>
+          <a:extLst>
+            <a:ext uri="{909E8E84-426E-40DD-AFC4-6F175D3DCCD1}">
+              <a14:hiddenFill xmlns:a14="http://schemas.microsoft.com/office/drawing/2010/main">
+                <a:solidFill>
+                  <a:srgbClr val="FFFFFF"/>
+                </a:solidFill>
+              </a14:hiddenFill>
+            </a:ext>
+          </a:extLst>
+        </p:spPr>
+      </p:pic>
+    </p:spTree>
+    <p:extLst>
+      <p:ext uri="{BB962C8B-B14F-4D97-AF65-F5344CB8AC3E}">
+        <p14:creationId xmlns:p14="http://schemas.microsoft.com/office/powerpoint/2010/main" val="2941656490"/>
+      </p:ext>
+    </p:extLst>
+  </p:cSld>
+  <p:clrMapOvr>
+    <a:masterClrMapping/>
+  </p:clrMapOvr>
+</p:sld>
+</file>
+
+<file path=ppt/slides/slide3.xml><?xml version="1.0" encoding="utf-8"?>
+<p:sld xmlns:a="http://schemas.openxmlformats.org/drawingml/2006/main" xmlns:r="http://schemas.openxmlformats.org/officeDocument/2006/relationships" xmlns:p="http://schemas.openxmlformats.org/presentationml/2006/main">
+  <p:cSld>
+    <p:spTree>
+      <p:nvGrpSpPr>
+        <p:cNvPr id="1" name="">
+          <a:extLst>
+            <a:ext uri="{FF2B5EF4-FFF2-40B4-BE49-F238E27FC236}">
+              <a16:creationId xmlns:a16="http://schemas.microsoft.com/office/drawing/2014/main" id="{C48EA397-4921-BDAB-A28F-2AE1CBEE68EF}"/>
+            </a:ext>
+          </a:extLst>
+        </p:cNvPr>
+        <p:cNvGrpSpPr/>
+        <p:nvPr/>
+      </p:nvGrpSpPr>
+      <p:grpSpPr>
+        <a:xfrm>
+          <a:off x="0" y="0"/>
+          <a:ext cx="0" cy="0"/>
+          <a:chOff x="0" y="0"/>
+          <a:chExt cx="0" cy="0"/>
+        </a:xfrm>
+      </p:grpSpPr>
+      <p:sp>
+        <p:nvSpPr>
+          <p:cNvPr id="2" name="Content Placeholder 1">
+            <a:extLst>
+              <a:ext uri="{FF2B5EF4-FFF2-40B4-BE49-F238E27FC236}">
+                <a16:creationId xmlns:a16="http://schemas.microsoft.com/office/drawing/2014/main" id="{45782BB9-88A6-E88E-D94B-3EE0681A33BF}"/>
+              </a:ext>
+            </a:extLst>
+          </p:cNvPr>
+          <p:cNvSpPr>
+            <a:spLocks noGrp="1"/>
+          </p:cNvSpPr>
+          <p:nvPr>
+            <p:ph sz="quarter" idx="13"/>
+          </p:nvPr>
+        </p:nvSpPr>
+        <p:spPr/>
+        <p:txBody>
+          <a:bodyPr/>
+          <a:lstStyle/>
+          <a:p>
+            <a:r>
+              <a:rPr lang="en-US" dirty="0"/>
+              <a:t>NWS Bulk Extract – FTP load and collation of tabular severe weather event data for DC/MD/VA</a:t>
+            </a:r>
+          </a:p>
+          <a:p>
+            <a:r>
+              <a:rPr lang="en-US" dirty="0"/>
+              <a:t>TIGER LINES extract (Andrew – how are you extracting?</a:t>
+            </a:r>
+            <a:endParaRPr lang="LID4096" dirty="0"/>
+          </a:p>
+        </p:txBody>
+      </p:sp>
+      <p:sp>
+        <p:nvSpPr>
+          <p:cNvPr id="3" name="Content Placeholder 2">
+            <a:extLst>
+              <a:ext uri="{FF2B5EF4-FFF2-40B4-BE49-F238E27FC236}">
+                <a16:creationId xmlns:a16="http://schemas.microsoft.com/office/drawing/2014/main" id="{3D9A8145-C723-2BF3-B112-43C16A6D70D6}"/>
+              </a:ext>
+            </a:extLst>
+          </p:cNvPr>
+          <p:cNvSpPr>
+            <a:spLocks noGrp="1"/>
+          </p:cNvSpPr>
+          <p:nvPr>
+            <p:ph sz="quarter" idx="14"/>
+          </p:nvPr>
+        </p:nvSpPr>
+        <p:spPr/>
+        <p:txBody>
+          <a:bodyPr/>
+          <a:lstStyle/>
+          <a:p>
+            <a:endParaRPr lang="LID4096"/>
+          </a:p>
+        </p:txBody>
+      </p:sp>
+      <p:sp>
+        <p:nvSpPr>
+          <p:cNvPr id="4" name="Title 3">
+            <a:extLst>
+              <a:ext uri="{FF2B5EF4-FFF2-40B4-BE49-F238E27FC236}">
+                <a16:creationId xmlns:a16="http://schemas.microsoft.com/office/drawing/2014/main" id="{EC557FBF-B480-65B9-45E9-D1B95E714A4F}"/>
+              </a:ext>
+            </a:extLst>
+          </p:cNvPr>
+          <p:cNvSpPr>
+            <a:spLocks noGrp="1"/>
+          </p:cNvSpPr>
+          <p:nvPr>
+            <p:ph type="title"/>
+          </p:nvPr>
+        </p:nvSpPr>
+        <p:spPr/>
+        <p:txBody>
+          <a:bodyPr/>
+          <a:lstStyle/>
+          <a:p>
+            <a:r>
+              <a:rPr lang="en-US" dirty="0"/>
+              <a:t>Data Extraction</a:t>
+            </a:r>
+            <a:endParaRPr lang="LID4096" dirty="0"/>
+          </a:p>
+        </p:txBody>
+      </p:sp>
+    </p:spTree>
+    <p:extLst>
+      <p:ext uri="{BB962C8B-B14F-4D97-AF65-F5344CB8AC3E}">
+        <p14:creationId xmlns:p14="http://schemas.microsoft.com/office/powerpoint/2010/main" val="2816459609"/>
+      </p:ext>
+    </p:extLst>
+  </p:cSld>
+  <p:clrMapOvr>
+    <a:masterClrMapping/>
+  </p:clrMapOvr>
+</p:sld>
+</file>
+
 <file path=ppt/slides/slide4.xml><?xml version="1.0" encoding="utf-8"?>
 <p:sld xmlns:a="http://schemas.openxmlformats.org/drawingml/2006/main" xmlns:r="http://schemas.openxmlformats.org/officeDocument/2006/relationships" xmlns:p="http://schemas.openxmlformats.org/presentationml/2006/main">
   <p:cSld>
@@ -7933,6 +8230,460 @@
           <p:cNvPr id="2" name="Content Placeholder 1">
             <a:extLst>
               <a:ext uri="{FF2B5EF4-FFF2-40B4-BE49-F238E27FC236}">
+                <a16:creationId xmlns:a16="http://schemas.microsoft.com/office/drawing/2014/main" id="{A6BC3380-3F1C-110A-870F-C2082DF66876}"/>
+              </a:ext>
+            </a:extLst>
+          </p:cNvPr>
+          <p:cNvSpPr>
+            <a:spLocks noGrp="1"/>
+          </p:cNvSpPr>
+          <p:nvPr>
+            <p:ph sz="quarter" idx="13"/>
+          </p:nvPr>
+        </p:nvSpPr>
+        <p:spPr/>
+        <p:txBody>
+          <a:bodyPr/>
+          <a:lstStyle/>
+          <a:p>
+            <a:endParaRPr lang="LID4096" dirty="0"/>
+          </a:p>
+        </p:txBody>
+      </p:sp>
+      <p:sp>
+        <p:nvSpPr>
+          <p:cNvPr id="3" name="Content Placeholder 2">
+            <a:extLst>
+              <a:ext uri="{FF2B5EF4-FFF2-40B4-BE49-F238E27FC236}">
+                <a16:creationId xmlns:a16="http://schemas.microsoft.com/office/drawing/2014/main" id="{6F453E3F-51A3-D35F-DDBF-AB0CF288A6EF}"/>
+              </a:ext>
+            </a:extLst>
+          </p:cNvPr>
+          <p:cNvSpPr>
+            <a:spLocks noGrp="1"/>
+          </p:cNvSpPr>
+          <p:nvPr>
+            <p:ph sz="quarter" idx="14"/>
+          </p:nvPr>
+        </p:nvSpPr>
+        <p:spPr/>
+        <p:txBody>
+          <a:bodyPr/>
+          <a:lstStyle/>
+          <a:p>
+            <a:endParaRPr lang="LID4096"/>
+          </a:p>
+        </p:txBody>
+      </p:sp>
+      <p:sp>
+        <p:nvSpPr>
+          <p:cNvPr id="4" name="Title 3">
+            <a:extLst>
+              <a:ext uri="{FF2B5EF4-FFF2-40B4-BE49-F238E27FC236}">
+                <a16:creationId xmlns:a16="http://schemas.microsoft.com/office/drawing/2014/main" id="{8001C504-A50E-2F48-E2A9-CEFABA5FFAC7}"/>
+              </a:ext>
+            </a:extLst>
+          </p:cNvPr>
+          <p:cNvSpPr>
+            <a:spLocks noGrp="1"/>
+          </p:cNvSpPr>
+          <p:nvPr>
+            <p:ph type="title"/>
+          </p:nvPr>
+        </p:nvSpPr>
+        <p:spPr/>
+        <p:txBody>
+          <a:bodyPr/>
+          <a:lstStyle/>
+          <a:p>
+            <a:r>
+              <a:rPr lang="en-US" dirty="0"/>
+              <a:t>Preprocessing</a:t>
+            </a:r>
+            <a:endParaRPr lang="LID4096" dirty="0"/>
+          </a:p>
+        </p:txBody>
+      </p:sp>
+    </p:spTree>
+    <p:extLst>
+      <p:ext uri="{BB962C8B-B14F-4D97-AF65-F5344CB8AC3E}">
+        <p14:creationId xmlns:p14="http://schemas.microsoft.com/office/powerpoint/2010/main" val="2215319454"/>
+      </p:ext>
+    </p:extLst>
+  </p:cSld>
+  <p:clrMapOvr>
+    <a:masterClrMapping/>
+  </p:clrMapOvr>
+</p:sld>
+</file>
+
+<file path=ppt/slides/slide5.xml><?xml version="1.0" encoding="utf-8"?>
+<p:sld xmlns:a="http://schemas.openxmlformats.org/drawingml/2006/main" xmlns:r="http://schemas.openxmlformats.org/officeDocument/2006/relationships" xmlns:p="http://schemas.openxmlformats.org/presentationml/2006/main">
+  <p:cSld>
+    <p:spTree>
+      <p:nvGrpSpPr>
+        <p:cNvPr id="1" name="">
+          <a:extLst>
+            <a:ext uri="{FF2B5EF4-FFF2-40B4-BE49-F238E27FC236}">
+              <a16:creationId xmlns:a16="http://schemas.microsoft.com/office/drawing/2014/main" id="{EAFF5C43-5862-9B88-2C82-77037E38709A}"/>
+            </a:ext>
+          </a:extLst>
+        </p:cNvPr>
+        <p:cNvGrpSpPr/>
+        <p:nvPr/>
+      </p:nvGrpSpPr>
+      <p:grpSpPr>
+        <a:xfrm>
+          <a:off x="0" y="0"/>
+          <a:ext cx="0" cy="0"/>
+          <a:chOff x="0" y="0"/>
+          <a:chExt cx="0" cy="0"/>
+        </a:xfrm>
+      </p:grpSpPr>
+      <p:sp>
+        <p:nvSpPr>
+          <p:cNvPr id="2" name="Content Placeholder 1">
+            <a:extLst>
+              <a:ext uri="{FF2B5EF4-FFF2-40B4-BE49-F238E27FC236}">
+                <a16:creationId xmlns:a16="http://schemas.microsoft.com/office/drawing/2014/main" id="{D14807E9-EFD5-F8E5-9030-919256087BA7}"/>
+              </a:ext>
+            </a:extLst>
+          </p:cNvPr>
+          <p:cNvSpPr>
+            <a:spLocks noGrp="1"/>
+          </p:cNvSpPr>
+          <p:nvPr>
+            <p:ph sz="quarter" idx="13"/>
+          </p:nvPr>
+        </p:nvSpPr>
+        <p:spPr/>
+        <p:txBody>
+          <a:bodyPr/>
+          <a:lstStyle/>
+          <a:p>
+            <a:endParaRPr lang="LID4096" dirty="0"/>
+          </a:p>
+        </p:txBody>
+      </p:sp>
+      <p:sp>
+        <p:nvSpPr>
+          <p:cNvPr id="3" name="Content Placeholder 2">
+            <a:extLst>
+              <a:ext uri="{FF2B5EF4-FFF2-40B4-BE49-F238E27FC236}">
+                <a16:creationId xmlns:a16="http://schemas.microsoft.com/office/drawing/2014/main" id="{1254B423-10A4-F207-6723-C5CDB5DF670F}"/>
+              </a:ext>
+            </a:extLst>
+          </p:cNvPr>
+          <p:cNvSpPr>
+            <a:spLocks noGrp="1"/>
+          </p:cNvSpPr>
+          <p:nvPr>
+            <p:ph sz="quarter" idx="14"/>
+          </p:nvPr>
+        </p:nvSpPr>
+        <p:spPr/>
+        <p:txBody>
+          <a:bodyPr/>
+          <a:lstStyle/>
+          <a:p>
+            <a:endParaRPr lang="LID4096"/>
+          </a:p>
+        </p:txBody>
+      </p:sp>
+      <p:sp>
+        <p:nvSpPr>
+          <p:cNvPr id="4" name="Title 3">
+            <a:extLst>
+              <a:ext uri="{FF2B5EF4-FFF2-40B4-BE49-F238E27FC236}">
+                <a16:creationId xmlns:a16="http://schemas.microsoft.com/office/drawing/2014/main" id="{9B937712-9B0D-D87D-1996-F34DF3C7A007}"/>
+              </a:ext>
+            </a:extLst>
+          </p:cNvPr>
+          <p:cNvSpPr>
+            <a:spLocks noGrp="1"/>
+          </p:cNvSpPr>
+          <p:nvPr>
+            <p:ph type="title"/>
+          </p:nvPr>
+        </p:nvSpPr>
+        <p:spPr/>
+        <p:txBody>
+          <a:bodyPr/>
+          <a:lstStyle/>
+          <a:p>
+            <a:r>
+              <a:rPr lang="en-US" dirty="0"/>
+              <a:t>Viz Overview</a:t>
+            </a:r>
+            <a:endParaRPr lang="LID4096" dirty="0"/>
+          </a:p>
+        </p:txBody>
+      </p:sp>
+    </p:spTree>
+    <p:extLst>
+      <p:ext uri="{BB962C8B-B14F-4D97-AF65-F5344CB8AC3E}">
+        <p14:creationId xmlns:p14="http://schemas.microsoft.com/office/powerpoint/2010/main" val="1625587121"/>
+      </p:ext>
+    </p:extLst>
+  </p:cSld>
+  <p:clrMapOvr>
+    <a:masterClrMapping/>
+  </p:clrMapOvr>
+</p:sld>
+</file>
+
+<file path=ppt/slides/slide6.xml><?xml version="1.0" encoding="utf-8"?>
+<p:sld xmlns:a="http://schemas.openxmlformats.org/drawingml/2006/main" xmlns:r="http://schemas.openxmlformats.org/officeDocument/2006/relationships" xmlns:p="http://schemas.openxmlformats.org/presentationml/2006/main">
+  <p:cSld>
+    <p:spTree>
+      <p:nvGrpSpPr>
+        <p:cNvPr id="1" name="">
+          <a:extLst>
+            <a:ext uri="{FF2B5EF4-FFF2-40B4-BE49-F238E27FC236}">
+              <a16:creationId xmlns:a16="http://schemas.microsoft.com/office/drawing/2014/main" id="{A6F51468-928A-EA0F-7A71-9ED71AAE649E}"/>
+            </a:ext>
+          </a:extLst>
+        </p:cNvPr>
+        <p:cNvGrpSpPr/>
+        <p:nvPr/>
+      </p:nvGrpSpPr>
+      <p:grpSpPr>
+        <a:xfrm>
+          <a:off x="0" y="0"/>
+          <a:ext cx="0" cy="0"/>
+          <a:chOff x="0" y="0"/>
+          <a:chExt cx="0" cy="0"/>
+        </a:xfrm>
+      </p:grpSpPr>
+      <p:sp>
+        <p:nvSpPr>
+          <p:cNvPr id="2" name="Content Placeholder 1">
+            <a:extLst>
+              <a:ext uri="{FF2B5EF4-FFF2-40B4-BE49-F238E27FC236}">
+                <a16:creationId xmlns:a16="http://schemas.microsoft.com/office/drawing/2014/main" id="{03F0F1F1-4038-5175-B85F-6B93A141B819}"/>
+              </a:ext>
+            </a:extLst>
+          </p:cNvPr>
+          <p:cNvSpPr>
+            <a:spLocks noGrp="1"/>
+          </p:cNvSpPr>
+          <p:nvPr>
+            <p:ph sz="quarter" idx="13"/>
+          </p:nvPr>
+        </p:nvSpPr>
+        <p:spPr/>
+        <p:txBody>
+          <a:bodyPr/>
+          <a:lstStyle/>
+          <a:p>
+            <a:endParaRPr lang="LID4096" dirty="0"/>
+          </a:p>
+        </p:txBody>
+      </p:sp>
+      <p:sp>
+        <p:nvSpPr>
+          <p:cNvPr id="3" name="Content Placeholder 2">
+            <a:extLst>
+              <a:ext uri="{FF2B5EF4-FFF2-40B4-BE49-F238E27FC236}">
+                <a16:creationId xmlns:a16="http://schemas.microsoft.com/office/drawing/2014/main" id="{0166AA17-2D85-24AF-A591-F4E5B0C4E4A0}"/>
+              </a:ext>
+            </a:extLst>
+          </p:cNvPr>
+          <p:cNvSpPr>
+            <a:spLocks noGrp="1"/>
+          </p:cNvSpPr>
+          <p:nvPr>
+            <p:ph sz="quarter" idx="14"/>
+          </p:nvPr>
+        </p:nvSpPr>
+        <p:spPr/>
+        <p:txBody>
+          <a:bodyPr/>
+          <a:lstStyle/>
+          <a:p>
+            <a:endParaRPr lang="LID4096"/>
+          </a:p>
+        </p:txBody>
+      </p:sp>
+      <p:sp>
+        <p:nvSpPr>
+          <p:cNvPr id="4" name="Title 3">
+            <a:extLst>
+              <a:ext uri="{FF2B5EF4-FFF2-40B4-BE49-F238E27FC236}">
+                <a16:creationId xmlns:a16="http://schemas.microsoft.com/office/drawing/2014/main" id="{161F4E70-0FDF-0D7F-15EF-3A86B13B45C6}"/>
+              </a:ext>
+            </a:extLst>
+          </p:cNvPr>
+          <p:cNvSpPr>
+            <a:spLocks noGrp="1"/>
+          </p:cNvSpPr>
+          <p:nvPr>
+            <p:ph type="title"/>
+          </p:nvPr>
+        </p:nvSpPr>
+        <p:spPr/>
+        <p:txBody>
+          <a:bodyPr/>
+          <a:lstStyle/>
+          <a:p>
+            <a:r>
+              <a:rPr lang="en-US" dirty="0"/>
+              <a:t>R Program Demo</a:t>
+            </a:r>
+            <a:endParaRPr lang="LID4096" dirty="0"/>
+          </a:p>
+        </p:txBody>
+      </p:sp>
+    </p:spTree>
+    <p:extLst>
+      <p:ext uri="{BB962C8B-B14F-4D97-AF65-F5344CB8AC3E}">
+        <p14:creationId xmlns:p14="http://schemas.microsoft.com/office/powerpoint/2010/main" val="1576534908"/>
+      </p:ext>
+    </p:extLst>
+  </p:cSld>
+  <p:clrMapOvr>
+    <a:masterClrMapping/>
+  </p:clrMapOvr>
+</p:sld>
+</file>
+
+<file path=ppt/slides/slide7.xml><?xml version="1.0" encoding="utf-8"?>
+<p:sld xmlns:a="http://schemas.openxmlformats.org/drawingml/2006/main" xmlns:r="http://schemas.openxmlformats.org/officeDocument/2006/relationships" xmlns:p="http://schemas.openxmlformats.org/presentationml/2006/main">
+  <p:cSld>
+    <p:spTree>
+      <p:nvGrpSpPr>
+        <p:cNvPr id="1" name="">
+          <a:extLst>
+            <a:ext uri="{FF2B5EF4-FFF2-40B4-BE49-F238E27FC236}">
+              <a16:creationId xmlns:a16="http://schemas.microsoft.com/office/drawing/2014/main" id="{A993698C-6073-CDDE-3D38-3D094C466A9C}"/>
+            </a:ext>
+          </a:extLst>
+        </p:cNvPr>
+        <p:cNvGrpSpPr/>
+        <p:nvPr/>
+      </p:nvGrpSpPr>
+      <p:grpSpPr>
+        <a:xfrm>
+          <a:off x="0" y="0"/>
+          <a:ext cx="0" cy="0"/>
+          <a:chOff x="0" y="0"/>
+          <a:chExt cx="0" cy="0"/>
+        </a:xfrm>
+      </p:grpSpPr>
+      <p:sp>
+        <p:nvSpPr>
+          <p:cNvPr id="2" name="Content Placeholder 1">
+            <a:extLst>
+              <a:ext uri="{FF2B5EF4-FFF2-40B4-BE49-F238E27FC236}">
+                <a16:creationId xmlns:a16="http://schemas.microsoft.com/office/drawing/2014/main" id="{006D00EA-0307-9916-F160-051AB2497188}"/>
+              </a:ext>
+            </a:extLst>
+          </p:cNvPr>
+          <p:cNvSpPr>
+            <a:spLocks noGrp="1"/>
+          </p:cNvSpPr>
+          <p:nvPr>
+            <p:ph sz="quarter" idx="13"/>
+          </p:nvPr>
+        </p:nvSpPr>
+        <p:spPr/>
+        <p:txBody>
+          <a:bodyPr/>
+          <a:lstStyle/>
+          <a:p>
+            <a:endParaRPr lang="LID4096" dirty="0"/>
+          </a:p>
+        </p:txBody>
+      </p:sp>
+      <p:sp>
+        <p:nvSpPr>
+          <p:cNvPr id="3" name="Content Placeholder 2">
+            <a:extLst>
+              <a:ext uri="{FF2B5EF4-FFF2-40B4-BE49-F238E27FC236}">
+                <a16:creationId xmlns:a16="http://schemas.microsoft.com/office/drawing/2014/main" id="{B506E126-E755-CE32-0968-641CCB701600}"/>
+              </a:ext>
+            </a:extLst>
+          </p:cNvPr>
+          <p:cNvSpPr>
+            <a:spLocks noGrp="1"/>
+          </p:cNvSpPr>
+          <p:nvPr>
+            <p:ph sz="quarter" idx="14"/>
+          </p:nvPr>
+        </p:nvSpPr>
+        <p:spPr/>
+        <p:txBody>
+          <a:bodyPr/>
+          <a:lstStyle/>
+          <a:p>
+            <a:endParaRPr lang="LID4096"/>
+          </a:p>
+        </p:txBody>
+      </p:sp>
+      <p:sp>
+        <p:nvSpPr>
+          <p:cNvPr id="4" name="Title 3">
+            <a:extLst>
+              <a:ext uri="{FF2B5EF4-FFF2-40B4-BE49-F238E27FC236}">
+                <a16:creationId xmlns:a16="http://schemas.microsoft.com/office/drawing/2014/main" id="{6C78523E-006D-5699-7F9B-193E429BB398}"/>
+              </a:ext>
+            </a:extLst>
+          </p:cNvPr>
+          <p:cNvSpPr>
+            <a:spLocks noGrp="1"/>
+          </p:cNvSpPr>
+          <p:nvPr>
+            <p:ph type="title"/>
+          </p:nvPr>
+        </p:nvSpPr>
+        <p:spPr/>
+        <p:txBody>
+          <a:bodyPr/>
+          <a:lstStyle/>
+          <a:p>
+            <a:r>
+              <a:rPr lang="en-US" dirty="0"/>
+              <a:t>Key Results and Findings</a:t>
+            </a:r>
+            <a:endParaRPr lang="LID4096" dirty="0"/>
+          </a:p>
+        </p:txBody>
+      </p:sp>
+    </p:spTree>
+    <p:extLst>
+      <p:ext uri="{BB962C8B-B14F-4D97-AF65-F5344CB8AC3E}">
+        <p14:creationId xmlns:p14="http://schemas.microsoft.com/office/powerpoint/2010/main" val="72964037"/>
+      </p:ext>
+    </p:extLst>
+  </p:cSld>
+  <p:clrMapOvr>
+    <a:masterClrMapping/>
+  </p:clrMapOvr>
+</p:sld>
+</file>
+
+<file path=ppt/slides/slide8.xml><?xml version="1.0" encoding="utf-8"?>
+<p:sld xmlns:a="http://schemas.openxmlformats.org/drawingml/2006/main" xmlns:r="http://schemas.openxmlformats.org/officeDocument/2006/relationships" xmlns:p="http://schemas.openxmlformats.org/presentationml/2006/main">
+  <p:cSld>
+    <p:spTree>
+      <p:nvGrpSpPr>
+        <p:cNvPr id="1" name=""/>
+        <p:cNvGrpSpPr/>
+        <p:nvPr/>
+      </p:nvGrpSpPr>
+      <p:grpSpPr>
+        <a:xfrm>
+          <a:off x="0" y="0"/>
+          <a:ext cx="0" cy="0"/>
+          <a:chOff x="0" y="0"/>
+          <a:chExt cx="0" cy="0"/>
+        </a:xfrm>
+      </p:grpSpPr>
+      <p:sp>
+        <p:nvSpPr>
+          <p:cNvPr id="2" name="Content Placeholder 1">
+            <a:extLst>
+              <a:ext uri="{FF2B5EF4-FFF2-40B4-BE49-F238E27FC236}">
                 <a16:creationId xmlns:a16="http://schemas.microsoft.com/office/drawing/2014/main" id="{6095E7D7-A195-B756-ECE3-DA1A99D80B87}"/>
               </a:ext>
             </a:extLst>
@@ -7949,7 +8700,30 @@
           <a:bodyPr/>
           <a:lstStyle/>
           <a:p>
-            <a:endParaRPr lang="LID4096"/>
+            <a:r>
+              <a:rPr lang="en-US" dirty="0" err="1">
+                <a:effectLst/>
+              </a:rPr>
+              <a:t>Ncei</a:t>
+            </a:r>
+            <a:r>
+              <a:rPr lang="en-US" dirty="0">
+                <a:effectLst/>
+              </a:rPr>
+              <a:t>. (n.d.). </a:t>
+            </a:r>
+            <a:r>
+              <a:rPr lang="en-US" i="1" dirty="0">
+                <a:effectLst/>
+              </a:rPr>
+              <a:t>Storm events database</a:t>
+            </a:r>
+            <a:r>
+              <a:rPr lang="en-US" dirty="0">
+                <a:effectLst/>
+              </a:rPr>
+              <a:t>. National Centers for Environmental Information. https://www.ncdc.noaa.gov/stormevents/ftp.jsp </a:t>
+            </a:r>
           </a:p>
         </p:txBody>
       </p:sp>
@@ -7995,7 +8769,7 @@
 </p:sld>
 </file>
 
-<file path=ppt/slides/slide5.xml><?xml version="1.0" encoding="utf-8"?>
+<file path=ppt/slides/slide9.xml><?xml version="1.0" encoding="utf-8"?>
 <p:sld xmlns:a="http://schemas.openxmlformats.org/drawingml/2006/main" xmlns:r="http://schemas.openxmlformats.org/officeDocument/2006/relationships" xmlns:p="http://schemas.openxmlformats.org/presentationml/2006/main">
   <p:cSld>
     <p:spTree>

</xml_diff>

<commit_message>
Add pivots and multibox, pp content
</commit_message>
<xml_diff>
--- a/6289_final_draft.pptx
+++ b/6289_final_draft.pptx
@@ -12,11 +12,12 @@
     <p:sldId id="263" r:id="rId6"/>
     <p:sldId id="262" r:id="rId7"/>
     <p:sldId id="265" r:id="rId8"/>
-    <p:sldId id="264" r:id="rId9"/>
-    <p:sldId id="266" r:id="rId10"/>
-    <p:sldId id="260" r:id="rId11"/>
-    <p:sldId id="259" r:id="rId12"/>
-    <p:sldId id="257" r:id="rId13"/>
+    <p:sldId id="268" r:id="rId9"/>
+    <p:sldId id="264" r:id="rId10"/>
+    <p:sldId id="266" r:id="rId11"/>
+    <p:sldId id="260" r:id="rId12"/>
+    <p:sldId id="259" r:id="rId13"/>
+    <p:sldId id="257" r:id="rId14"/>
   </p:sldIdLst>
   <p:sldSz cx="12192000" cy="6858000"/>
   <p:notesSz cx="6858000" cy="9144000"/>
@@ -7721,6 +7722,94 @@
       </p:grpSpPr>
       <p:sp>
         <p:nvSpPr>
+          <p:cNvPr id="2" name="Title 1">
+            <a:extLst>
+              <a:ext uri="{FF2B5EF4-FFF2-40B4-BE49-F238E27FC236}">
+                <a16:creationId xmlns:a16="http://schemas.microsoft.com/office/drawing/2014/main" id="{C9B48326-D702-27B2-687B-847897113B7D}"/>
+              </a:ext>
+            </a:extLst>
+          </p:cNvPr>
+          <p:cNvSpPr>
+            <a:spLocks noGrp="1"/>
+          </p:cNvSpPr>
+          <p:nvPr>
+            <p:ph type="title"/>
+          </p:nvPr>
+        </p:nvSpPr>
+        <p:spPr/>
+        <p:txBody>
+          <a:bodyPr/>
+          <a:lstStyle/>
+          <a:p>
+            <a:r>
+              <a:rPr lang="en-US" dirty="0"/>
+              <a:t>Thank You!</a:t>
+            </a:r>
+            <a:endParaRPr lang="LID4096" dirty="0"/>
+          </a:p>
+        </p:txBody>
+      </p:sp>
+      <p:sp>
+        <p:nvSpPr>
+          <p:cNvPr id="3" name="Text Placeholder 2">
+            <a:extLst>
+              <a:ext uri="{FF2B5EF4-FFF2-40B4-BE49-F238E27FC236}">
+                <a16:creationId xmlns:a16="http://schemas.microsoft.com/office/drawing/2014/main" id="{CC8A8303-031E-4F5D-DB2B-973EE1FBE7C2}"/>
+              </a:ext>
+            </a:extLst>
+          </p:cNvPr>
+          <p:cNvSpPr>
+            <a:spLocks noGrp="1"/>
+          </p:cNvSpPr>
+          <p:nvPr>
+            <p:ph type="body" idx="1"/>
+          </p:nvPr>
+        </p:nvSpPr>
+        <p:spPr/>
+        <p:txBody>
+          <a:bodyPr/>
+          <a:lstStyle/>
+          <a:p>
+            <a:r>
+              <a:rPr lang="en-US" dirty="0"/>
+              <a:t>Questions?</a:t>
+            </a:r>
+            <a:endParaRPr lang="LID4096" dirty="0"/>
+          </a:p>
+        </p:txBody>
+      </p:sp>
+    </p:spTree>
+    <p:extLst>
+      <p:ext uri="{BB962C8B-B14F-4D97-AF65-F5344CB8AC3E}">
+        <p14:creationId xmlns:p14="http://schemas.microsoft.com/office/powerpoint/2010/main" val="887372602"/>
+      </p:ext>
+    </p:extLst>
+  </p:cSld>
+  <p:clrMapOvr>
+    <a:masterClrMapping/>
+  </p:clrMapOvr>
+</p:sld>
+</file>
+
+<file path=ppt/slides/slide11.xml><?xml version="1.0" encoding="utf-8"?>
+<p:sld xmlns:a="http://schemas.openxmlformats.org/drawingml/2006/main" xmlns:r="http://schemas.openxmlformats.org/officeDocument/2006/relationships" xmlns:p="http://schemas.openxmlformats.org/presentationml/2006/main">
+  <p:cSld>
+    <p:spTree>
+      <p:nvGrpSpPr>
+        <p:cNvPr id="1" name=""/>
+        <p:cNvGrpSpPr/>
+        <p:nvPr/>
+      </p:nvGrpSpPr>
+      <p:grpSpPr>
+        <a:xfrm>
+          <a:off x="0" y="0"/>
+          <a:ext cx="0" cy="0"/>
+          <a:chOff x="0" y="0"/>
+          <a:chExt cx="0" cy="0"/>
+        </a:xfrm>
+      </p:grpSpPr>
+      <p:sp>
+        <p:nvSpPr>
           <p:cNvPr id="10" name="Content Placeholder 9">
             <a:extLst>
               <a:ext uri="{FF2B5EF4-FFF2-40B4-BE49-F238E27FC236}">
@@ -8386,7 +8475,7 @@
           <a:bodyPr/>
           <a:lstStyle/>
           <a:p>
-            <a:endParaRPr lang="LID4096"/>
+            <a:endParaRPr lang="LID4096" dirty="0"/>
           </a:p>
         </p:txBody>
       </p:sp>
@@ -8433,6 +8522,197 @@
 </file>
 
 <file path=ppt/slides/slide6.xml><?xml version="1.0" encoding="utf-8"?>
+<p:sld xmlns:a="http://schemas.openxmlformats.org/drawingml/2006/main" xmlns:r="http://schemas.openxmlformats.org/officeDocument/2006/relationships" xmlns:p="http://schemas.openxmlformats.org/presentationml/2006/main">
+  <p:cSld>
+    <p:spTree>
+      <p:nvGrpSpPr>
+        <p:cNvPr id="1" name="">
+          <a:extLst>
+            <a:ext uri="{FF2B5EF4-FFF2-40B4-BE49-F238E27FC236}">
+              <a16:creationId xmlns:a16="http://schemas.microsoft.com/office/drawing/2014/main" id="{56F428B4-9723-E854-252E-26EE6575E1BF}"/>
+            </a:ext>
+          </a:extLst>
+        </p:cNvPr>
+        <p:cNvGrpSpPr/>
+        <p:nvPr/>
+      </p:nvGrpSpPr>
+      <p:grpSpPr>
+        <a:xfrm>
+          <a:off x="0" y="0"/>
+          <a:ext cx="0" cy="0"/>
+          <a:chOff x="0" y="0"/>
+          <a:chExt cx="0" cy="0"/>
+        </a:xfrm>
+      </p:grpSpPr>
+      <p:sp>
+        <p:nvSpPr>
+          <p:cNvPr id="2" name="Content Placeholder 1">
+            <a:extLst>
+              <a:ext uri="{FF2B5EF4-FFF2-40B4-BE49-F238E27FC236}">
+                <a16:creationId xmlns:a16="http://schemas.microsoft.com/office/drawing/2014/main" id="{649AAAEF-DA55-32CC-B7DB-ED62EBF61881}"/>
+              </a:ext>
+            </a:extLst>
+          </p:cNvPr>
+          <p:cNvSpPr>
+            <a:spLocks noGrp="1"/>
+          </p:cNvSpPr>
+          <p:nvPr>
+            <p:ph sz="quarter" idx="13"/>
+          </p:nvPr>
+        </p:nvSpPr>
+        <p:spPr/>
+        <p:txBody>
+          <a:bodyPr/>
+          <a:lstStyle/>
+          <a:p>
+            <a:pPr marL="342900" indent="-342900">
+              <a:buFont typeface="Arial" panose="020B0604020202020204" pitchFamily="34" charset="0"/>
+              <a:buChar char="•"/>
+            </a:pPr>
+            <a:r>
+              <a:rPr lang="en-US" dirty="0" err="1"/>
+              <a:t>Multiboxplot</a:t>
+            </a:r>
+            <a:r>
+              <a:rPr lang="en-US" dirty="0"/>
+              <a:t> with decade total events by CZ_FIPS (county code)</a:t>
+            </a:r>
+          </a:p>
+          <a:p>
+            <a:pPr marL="342900" indent="-342900">
+              <a:buFont typeface="Arial" panose="020B0604020202020204" pitchFamily="34" charset="0"/>
+              <a:buChar char="•"/>
+            </a:pPr>
+            <a:r>
+              <a:rPr lang="en-US" dirty="0"/>
+              <a:t>Observe distinct increasing trend in the number of severe events. </a:t>
+            </a:r>
+          </a:p>
+          <a:p>
+            <a:pPr marL="342900" indent="-342900">
+              <a:buFont typeface="Arial" panose="020B0604020202020204" pitchFamily="34" charset="0"/>
+              <a:buChar char="•"/>
+            </a:pPr>
+            <a:r>
+              <a:rPr lang="en-US"/>
+              <a:t>(2020s </a:t>
+            </a:r>
+            <a:r>
+              <a:rPr lang="en-US" dirty="0"/>
+              <a:t>being a decade </a:t>
+            </a:r>
+            <a:r>
+              <a:rPr lang="en-US"/>
+              <a:t>to-date total)</a:t>
+            </a:r>
+            <a:endParaRPr lang="LID4096" dirty="0"/>
+          </a:p>
+          <a:p>
+            <a:endParaRPr lang="LID4096" dirty="0"/>
+          </a:p>
+          <a:p>
+            <a:endParaRPr lang="LID4096" dirty="0"/>
+          </a:p>
+        </p:txBody>
+      </p:sp>
+      <p:sp>
+        <p:nvSpPr>
+          <p:cNvPr id="3" name="Content Placeholder 2">
+            <a:extLst>
+              <a:ext uri="{FF2B5EF4-FFF2-40B4-BE49-F238E27FC236}">
+                <a16:creationId xmlns:a16="http://schemas.microsoft.com/office/drawing/2014/main" id="{EA3642A4-67D9-6723-AA77-C852CBA857D8}"/>
+              </a:ext>
+            </a:extLst>
+          </p:cNvPr>
+          <p:cNvSpPr>
+            <a:spLocks noGrp="1"/>
+          </p:cNvSpPr>
+          <p:nvPr>
+            <p:ph sz="quarter" idx="14"/>
+          </p:nvPr>
+        </p:nvSpPr>
+        <p:spPr/>
+        <p:txBody>
+          <a:bodyPr/>
+          <a:lstStyle/>
+          <a:p>
+            <a:endParaRPr lang="LID4096" dirty="0"/>
+          </a:p>
+        </p:txBody>
+      </p:sp>
+      <p:sp>
+        <p:nvSpPr>
+          <p:cNvPr id="4" name="Title 3">
+            <a:extLst>
+              <a:ext uri="{FF2B5EF4-FFF2-40B4-BE49-F238E27FC236}">
+                <a16:creationId xmlns:a16="http://schemas.microsoft.com/office/drawing/2014/main" id="{4F99F47A-03B7-7368-503B-FD51DD6593FE}"/>
+              </a:ext>
+            </a:extLst>
+          </p:cNvPr>
+          <p:cNvSpPr>
+            <a:spLocks noGrp="1"/>
+          </p:cNvSpPr>
+          <p:nvPr>
+            <p:ph type="title"/>
+          </p:nvPr>
+        </p:nvSpPr>
+        <p:spPr/>
+        <p:txBody>
+          <a:bodyPr/>
+          <a:lstStyle/>
+          <a:p>
+            <a:r>
+              <a:rPr lang="en-US" dirty="0"/>
+              <a:t>Total County Events By Decade</a:t>
+            </a:r>
+            <a:endParaRPr lang="LID4096" dirty="0"/>
+          </a:p>
+        </p:txBody>
+      </p:sp>
+      <p:pic>
+        <p:nvPicPr>
+          <p:cNvPr id="9" name="Picture 8">
+            <a:extLst>
+              <a:ext uri="{FF2B5EF4-FFF2-40B4-BE49-F238E27FC236}">
+                <a16:creationId xmlns:a16="http://schemas.microsoft.com/office/drawing/2014/main" id="{E15709E1-E728-830C-7811-AB0CDDCC2844}"/>
+              </a:ext>
+            </a:extLst>
+          </p:cNvPr>
+          <p:cNvPicPr>
+            <a:picLocks noChangeAspect="1"/>
+          </p:cNvPicPr>
+          <p:nvPr/>
+        </p:nvPicPr>
+        <p:blipFill>
+          <a:blip r:embed="rId2"/>
+          <a:stretch>
+            <a:fillRect/>
+          </a:stretch>
+        </p:blipFill>
+        <p:spPr>
+          <a:xfrm>
+            <a:off x="6172199" y="1825625"/>
+            <a:ext cx="5565120" cy="3434474"/>
+          </a:xfrm>
+          <a:prstGeom prst="rect">
+            <a:avLst/>
+          </a:prstGeom>
+        </p:spPr>
+      </p:pic>
+    </p:spTree>
+    <p:extLst>
+      <p:ext uri="{BB962C8B-B14F-4D97-AF65-F5344CB8AC3E}">
+        <p14:creationId xmlns:p14="http://schemas.microsoft.com/office/powerpoint/2010/main" val="2068280175"/>
+      </p:ext>
+    </p:extLst>
+  </p:cSld>
+  <p:clrMapOvr>
+    <a:masterClrMapping/>
+  </p:clrMapOvr>
+</p:sld>
+</file>
+
+<file path=ppt/slides/slide7.xml><?xml version="1.0" encoding="utf-8"?>
 <p:sld xmlns:a="http://schemas.openxmlformats.org/drawingml/2006/main" xmlns:r="http://schemas.openxmlformats.org/officeDocument/2006/relationships" xmlns:p="http://schemas.openxmlformats.org/presentationml/2006/main">
   <p:cSld>
     <p:spTree>
@@ -8547,7 +8827,7 @@
 </p:sld>
 </file>
 
-<file path=ppt/slides/slide7.xml><?xml version="1.0" encoding="utf-8"?>
+<file path=ppt/slides/slide8.xml><?xml version="1.0" encoding="utf-8"?>
 <p:sld xmlns:a="http://schemas.openxmlformats.org/drawingml/2006/main" xmlns:r="http://schemas.openxmlformats.org/officeDocument/2006/relationships" xmlns:p="http://schemas.openxmlformats.org/presentationml/2006/main">
   <p:cSld>
     <p:spTree>
@@ -8653,113 +8933,6 @@
     <p:extLst>
       <p:ext uri="{BB962C8B-B14F-4D97-AF65-F5344CB8AC3E}">
         <p14:creationId xmlns:p14="http://schemas.microsoft.com/office/powerpoint/2010/main" val="72964037"/>
-      </p:ext>
-    </p:extLst>
-  </p:cSld>
-  <p:clrMapOvr>
-    <a:masterClrMapping/>
-  </p:clrMapOvr>
-</p:sld>
-</file>
-
-<file path=ppt/slides/slide8.xml><?xml version="1.0" encoding="utf-8"?>
-<p:sld xmlns:a="http://schemas.openxmlformats.org/drawingml/2006/main" xmlns:r="http://schemas.openxmlformats.org/officeDocument/2006/relationships" xmlns:p="http://schemas.openxmlformats.org/presentationml/2006/main">
-  <p:cSld>
-    <p:spTree>
-      <p:nvGrpSpPr>
-        <p:cNvPr id="1" name=""/>
-        <p:cNvGrpSpPr/>
-        <p:nvPr/>
-      </p:nvGrpSpPr>
-      <p:grpSpPr>
-        <a:xfrm>
-          <a:off x="0" y="0"/>
-          <a:ext cx="0" cy="0"/>
-          <a:chOff x="0" y="0"/>
-          <a:chExt cx="0" cy="0"/>
-        </a:xfrm>
-      </p:grpSpPr>
-      <p:sp>
-        <p:nvSpPr>
-          <p:cNvPr id="2" name="Content Placeholder 1">
-            <a:extLst>
-              <a:ext uri="{FF2B5EF4-FFF2-40B4-BE49-F238E27FC236}">
-                <a16:creationId xmlns:a16="http://schemas.microsoft.com/office/drawing/2014/main" id="{6095E7D7-A195-B756-ECE3-DA1A99D80B87}"/>
-              </a:ext>
-            </a:extLst>
-          </p:cNvPr>
-          <p:cNvSpPr>
-            <a:spLocks noGrp="1"/>
-          </p:cNvSpPr>
-          <p:nvPr>
-            <p:ph idx="13"/>
-          </p:nvPr>
-        </p:nvSpPr>
-        <p:spPr/>
-        <p:txBody>
-          <a:bodyPr/>
-          <a:lstStyle/>
-          <a:p>
-            <a:r>
-              <a:rPr lang="en-US" dirty="0" err="1">
-                <a:effectLst/>
-              </a:rPr>
-              <a:t>Ncei</a:t>
-            </a:r>
-            <a:r>
-              <a:rPr lang="en-US" dirty="0">
-                <a:effectLst/>
-              </a:rPr>
-              <a:t>. (n.d.). </a:t>
-            </a:r>
-            <a:r>
-              <a:rPr lang="en-US" i="1" dirty="0">
-                <a:effectLst/>
-              </a:rPr>
-              <a:t>Storm events database</a:t>
-            </a:r>
-            <a:r>
-              <a:rPr lang="en-US" dirty="0">
-                <a:effectLst/>
-              </a:rPr>
-              <a:t>. National Centers for Environmental Information. https://www.ncdc.noaa.gov/stormevents/ftp.jsp </a:t>
-            </a:r>
-          </a:p>
-        </p:txBody>
-      </p:sp>
-      <p:sp>
-        <p:nvSpPr>
-          <p:cNvPr id="3" name="Title 2">
-            <a:extLst>
-              <a:ext uri="{FF2B5EF4-FFF2-40B4-BE49-F238E27FC236}">
-                <a16:creationId xmlns:a16="http://schemas.microsoft.com/office/drawing/2014/main" id="{31EA2A7E-E62B-5176-26E1-0C93EF0A661D}"/>
-              </a:ext>
-            </a:extLst>
-          </p:cNvPr>
-          <p:cNvSpPr>
-            <a:spLocks noGrp="1"/>
-          </p:cNvSpPr>
-          <p:nvPr>
-            <p:ph type="title"/>
-          </p:nvPr>
-        </p:nvSpPr>
-        <p:spPr/>
-        <p:txBody>
-          <a:bodyPr/>
-          <a:lstStyle/>
-          <a:p>
-            <a:r>
-              <a:rPr lang="en-US" dirty="0"/>
-              <a:t>Citations</a:t>
-            </a:r>
-            <a:endParaRPr lang="LID4096" dirty="0"/>
-          </a:p>
-        </p:txBody>
-      </p:sp>
-    </p:spTree>
-    <p:extLst>
-      <p:ext uri="{BB962C8B-B14F-4D97-AF65-F5344CB8AC3E}">
-        <p14:creationId xmlns:p14="http://schemas.microsoft.com/office/powerpoint/2010/main" val="2080757994"/>
       </p:ext>
     </p:extLst>
   </p:cSld>
@@ -8788,10 +8961,58 @@
       </p:grpSpPr>
       <p:sp>
         <p:nvSpPr>
-          <p:cNvPr id="2" name="Title 1">
-            <a:extLst>
-              <a:ext uri="{FF2B5EF4-FFF2-40B4-BE49-F238E27FC236}">
-                <a16:creationId xmlns:a16="http://schemas.microsoft.com/office/drawing/2014/main" id="{C9B48326-D702-27B2-687B-847897113B7D}"/>
+          <p:cNvPr id="2" name="Content Placeholder 1">
+            <a:extLst>
+              <a:ext uri="{FF2B5EF4-FFF2-40B4-BE49-F238E27FC236}">
+                <a16:creationId xmlns:a16="http://schemas.microsoft.com/office/drawing/2014/main" id="{6095E7D7-A195-B756-ECE3-DA1A99D80B87}"/>
+              </a:ext>
+            </a:extLst>
+          </p:cNvPr>
+          <p:cNvSpPr>
+            <a:spLocks noGrp="1"/>
+          </p:cNvSpPr>
+          <p:nvPr>
+            <p:ph idx="13"/>
+          </p:nvPr>
+        </p:nvSpPr>
+        <p:spPr/>
+        <p:txBody>
+          <a:bodyPr/>
+          <a:lstStyle/>
+          <a:p>
+            <a:r>
+              <a:rPr lang="en-US" dirty="0" err="1">
+                <a:effectLst/>
+              </a:rPr>
+              <a:t>Ncei</a:t>
+            </a:r>
+            <a:r>
+              <a:rPr lang="en-US" dirty="0">
+                <a:effectLst/>
+              </a:rPr>
+              <a:t>. (n.d.). </a:t>
+            </a:r>
+            <a:r>
+              <a:rPr lang="en-US" i="1" dirty="0">
+                <a:effectLst/>
+              </a:rPr>
+              <a:t>Storm events database</a:t>
+            </a:r>
+            <a:r>
+              <a:rPr lang="en-US" dirty="0">
+                <a:effectLst/>
+              </a:rPr>
+              <a:t>. National Centers for Environmental Information. https://www.ncdc.noaa.gov/stormevents/ftp.jsp </a:t>
+            </a:r>
+          </a:p>
+        </p:txBody>
+      </p:sp>
+      <p:sp>
+        <p:nvSpPr>
+          <p:cNvPr id="3" name="Title 2">
+            <a:extLst>
+              <a:ext uri="{FF2B5EF4-FFF2-40B4-BE49-F238E27FC236}">
+                <a16:creationId xmlns:a16="http://schemas.microsoft.com/office/drawing/2014/main" id="{31EA2A7E-E62B-5176-26E1-0C93EF0A661D}"/>
               </a:ext>
             </a:extLst>
           </p:cNvPr>
@@ -8809,36 +9030,7 @@
           <a:p>
             <a:r>
               <a:rPr lang="en-US" dirty="0"/>
-              <a:t>Thank You!</a:t>
-            </a:r>
-            <a:endParaRPr lang="LID4096" dirty="0"/>
-          </a:p>
-        </p:txBody>
-      </p:sp>
-      <p:sp>
-        <p:nvSpPr>
-          <p:cNvPr id="3" name="Text Placeholder 2">
-            <a:extLst>
-              <a:ext uri="{FF2B5EF4-FFF2-40B4-BE49-F238E27FC236}">
-                <a16:creationId xmlns:a16="http://schemas.microsoft.com/office/drawing/2014/main" id="{CC8A8303-031E-4F5D-DB2B-973EE1FBE7C2}"/>
-              </a:ext>
-            </a:extLst>
-          </p:cNvPr>
-          <p:cNvSpPr>
-            <a:spLocks noGrp="1"/>
-          </p:cNvSpPr>
-          <p:nvPr>
-            <p:ph type="body" idx="1"/>
-          </p:nvPr>
-        </p:nvSpPr>
-        <p:spPr/>
-        <p:txBody>
-          <a:bodyPr/>
-          <a:lstStyle/>
-          <a:p>
-            <a:r>
-              <a:rPr lang="en-US" dirty="0"/>
-              <a:t>Questions?</a:t>
+              <a:t>Citations</a:t>
             </a:r>
             <a:endParaRPr lang="LID4096" dirty="0"/>
           </a:p>
@@ -8847,7 +9039,7 @@
     </p:spTree>
     <p:extLst>
       <p:ext uri="{BB962C8B-B14F-4D97-AF65-F5344CB8AC3E}">
-        <p14:creationId xmlns:p14="http://schemas.microsoft.com/office/powerpoint/2010/main" val="887372602"/>
+        <p14:creationId xmlns:p14="http://schemas.microsoft.com/office/powerpoint/2010/main" val="2080757994"/>
       </p:ext>
     </p:extLst>
   </p:cSld>

</xml_diff>

<commit_message>
added new color to extraction slides
</commit_message>
<xml_diff>
--- a/6289_final_draft.pptx
+++ b/6289_final_draft.pptx
@@ -7870,50 +7870,54 @@
           <a:lstStyle/>
           <a:p>
             <a:r>
-              <a:rPr lang="en-US" b="1" dirty="0"/>
+              <a:rPr lang="en-US" sz="2400" b="1" dirty="0"/>
               <a:t>Census Geometries </a:t>
             </a:r>
             <a:r>
-              <a:rPr lang="en-US" dirty="0"/>
+              <a:rPr lang="en-US" sz="2400" dirty="0"/>
               <a:t>– were gathered from the </a:t>
             </a:r>
             <a:r>
-              <a:rPr lang="en-US" dirty="0">
+              <a:rPr lang="en-US" sz="2400" dirty="0">
                 <a:hlinkClick r:id="rId2"/>
               </a:rPr>
               <a:t>US Census Geography API </a:t>
             </a:r>
             <a:r>
-              <a:rPr lang="en-US" dirty="0"/>
+              <a:rPr lang="en-US" sz="2400" dirty="0"/>
               <a:t>hosted by ArcGIS Hub and available via rest.  Census Block Groups were pulled for DC, Maryland, and Virginia via a predefined pipeline to reach from this service and pull </a:t>
             </a:r>
             <a:r>
-              <a:rPr lang="en-US" dirty="0" err="1"/>
+              <a:rPr lang="en-US" sz="2400" dirty="0" err="1"/>
               <a:t>en</a:t>
             </a:r>
             <a:r>
-              <a:rPr lang="en-US" dirty="0"/>
-              <a:t> masse. </a:t>
+              <a:rPr lang="en-US" sz="2400" dirty="0"/>
+              <a:t> masse. The data schema for is relatively limited, as these geometries highlight only locational and areal statistics.</a:t>
             </a:r>
           </a:p>
           <a:p>
             <a:r>
-              <a:rPr lang="en-US" b="1" dirty="0"/>
+              <a:rPr lang="en-US" sz="2400" b="1" dirty="0"/>
               <a:t>Building Footprints </a:t>
             </a:r>
             <a:r>
-              <a:rPr lang="en-US" dirty="0"/>
+              <a:rPr lang="en-US" sz="2400" dirty="0"/>
               <a:t>– were fetched using the </a:t>
             </a:r>
             <a:r>
-              <a:rPr lang="en-US" dirty="0">
+              <a:rPr lang="en-US" sz="2400" dirty="0">
                 <a:hlinkClick r:id="rId3"/>
               </a:rPr>
               <a:t>OpenStreetMap Overpass API</a:t>
             </a:r>
             <a:r>
+              <a:rPr lang="en-US" sz="2400" dirty="0"/>
+              <a:t>, which accepts a BBOX for extraction and some minor cleaning to format in a way that makes sense. The schema for OSM is massive, as it is crowdsourced, and attribution is dependent solely on manual entry</a:t>
+            </a:r>
+            <a:r>
               <a:rPr lang="en-US" dirty="0"/>
-              <a:t>, which accepts a BBOX for extraction and some minor cleaning to format in a way that makes sense. </a:t>
+              <a:t>. </a:t>
             </a:r>
             <a:endParaRPr lang="LID4096"/>
           </a:p>

</xml_diff>